<commit_message>
TUTTO QUASI FUNZIONANTE. LA PRESENTAZIONE ANCORA HA QUALCHE PROBLEMA
</commit_message>
<xml_diff>
--- a/backend/data/exports/test_presentation.pptx
+++ b/backend/data/exports/test_presentation.pptx
@@ -7,6 +7,9 @@
   <p:sldIdLst>
     <p:sldId id="256" r:id="rId7"/>
     <p:sldId id="257" r:id="rId8"/>
+    <p:sldId id="258" r:id="rId9"/>
+    <p:sldId id="259" r:id="rId10"/>
+    <p:sldId id="260" r:id="rId11"/>
   </p:sldIdLst>
   <p:sldSz cx="12188952" cy="6858000" type="screen4x3"/>
   <p:notesSz cx="6858000" cy="9144000"/>
@@ -3126,7 +3129,7 @@
           <a:lstStyle/>
           <a:p>
             <a:r>
-              <a:t>Presentazione di 1 unità navali</a:t>
+              <a:t>Presentazione di 4 unità navali</a:t>
             </a:r>
           </a:p>
         </p:txBody>
@@ -3159,14 +3162,57 @@
       <p:grpSpPr/>
       <p:sp>
         <p:nvSpPr>
-          <p:cNvPr id="2" name="TextBox 1"/>
+          <p:cNvPr id="2" name="Rectangle 1"/>
+          <p:cNvSpPr/>
+          <p:nvPr/>
+        </p:nvSpPr>
+        <p:spPr>
+          <a:xfrm>
+            <a:off x="0" y="0"/>
+            <a:ext cx="9753600" cy="5486400"/>
+          </a:xfrm>
+          <a:prstGeom prst="rect">
+            <a:avLst/>
+          </a:prstGeom>
+          <a:noFill/>
+          <a:ln w="50800">
+            <a:solidFill>
+              <a:srgbClr val="FF0000"/>
+            </a:solidFill>
+          </a:ln>
+        </p:spPr>
+        <p:style>
+          <a:lnRef idx="1">
+            <a:schemeClr val="accent1"/>
+          </a:lnRef>
+          <a:fillRef idx="3">
+            <a:schemeClr val="accent1"/>
+          </a:fillRef>
+          <a:effectRef idx="2">
+            <a:schemeClr val="accent1"/>
+          </a:effectRef>
+          <a:fontRef idx="minor">
+            <a:schemeClr val="lt1"/>
+          </a:fontRef>
+        </p:style>
+        <p:txBody>
+          <a:bodyPr rtlCol="0" anchor="ctr"/>
+          <a:lstStyle/>
+          <a:p>
+            <a:pPr algn="ctr"/>
+          </a:p>
+        </p:txBody>
+      </p:sp>
+      <p:sp>
+        <p:nvSpPr>
+          <p:cNvPr id="3" name="TextBox 2"/>
           <p:cNvSpPr txBox="1"/>
           <p:nvPr/>
         </p:nvSpPr>
         <p:spPr>
           <a:xfrm>
-            <a:off x="1524000" y="285750"/>
-            <a:ext cx="3810000" cy="381000"/>
+            <a:off x="1143000" y="228600"/>
+            <a:ext cx="4023360" cy="289560"/>
           </a:xfrm>
           <a:prstGeom prst="rect">
             <a:avLst/>
@@ -3183,21 +3229,21 @@
               <a:defRPr sz="2000" b="1"/>
             </a:pPr>
             <a:r>
-              <a:t>CLASSE UNITA': [Classe]</a:t>
-            </a:r>
-          </a:p>
-        </p:txBody>
-      </p:sp>
-      <p:sp>
-        <p:nvSpPr>
-          <p:cNvPr id="3" name="TextBox 2"/>
+              <a:t>DDG ANDREA DORIA</a:t>
+            </a:r>
+          </a:p>
+        </p:txBody>
+      </p:sp>
+      <p:sp>
+        <p:nvSpPr>
+          <p:cNvPr id="4" name="TextBox 3"/>
           <p:cNvSpPr txBox="1"/>
           <p:nvPr/>
         </p:nvSpPr>
         <p:spPr>
           <a:xfrm>
-            <a:off x="1524000" y="762000"/>
-            <a:ext cx="3810000" cy="381000"/>
+            <a:off x="1143000" y="609600"/>
+            <a:ext cx="4084320" cy="304800"/>
           </a:xfrm>
           <a:prstGeom prst="rect">
             <a:avLst/>
@@ -3214,14 +3260,14 @@
               <a:defRPr sz="2000" b="1"/>
             </a:pPr>
             <a:r>
-              <a:t>NOME UNITA' NAVALE: [Nome]</a:t>
+              <a:t>CLASSE ORIZZONTE</a:t>
             </a:r>
           </a:p>
         </p:txBody>
       </p:sp>
       <p:pic>
         <p:nvPicPr>
-          <p:cNvPr id="4" name="Picture 3" descr="1935dec0-3c96-49df-b726-593ab02821ee.png"/>
+          <p:cNvPr id="5" name="Picture 4" descr="download_e9fcb18065e54612a9a7ae6345585518.png"/>
           <p:cNvPicPr>
             <a:picLocks noChangeAspect="1"/>
           </p:cNvPicPr>
@@ -3235,45 +3281,17 @@
         </p:blipFill>
         <p:spPr>
           <a:xfrm>
-            <a:off x="190500" y="190500"/>
-            <a:ext cx="1143000" cy="1143000"/>
+            <a:off x="8458200" y="217578"/>
+            <a:ext cx="1132114" cy="753563"/>
           </a:xfrm>
           <a:prstGeom prst="rect">
             <a:avLst/>
           </a:prstGeom>
         </p:spPr>
       </p:pic>
-      <p:sp>
-        <p:nvSpPr>
-          <p:cNvPr id="5" name="TextBox 4"/>
-          <p:cNvSpPr txBox="1"/>
-          <p:nvPr/>
-        </p:nvSpPr>
-        <p:spPr>
-          <a:xfrm>
-            <a:off x="9363075" y="190500"/>
-            <a:ext cx="1143000" cy="762000"/>
-          </a:xfrm>
-          <a:prstGeom prst="rect">
-            <a:avLst/>
-          </a:prstGeom>
-          <a:noFill/>
-        </p:spPr>
-        <p:txBody>
-          <a:bodyPr wrap="none">
-            <a:spAutoFit/>
-          </a:bodyPr>
-          <a:lstStyle/>
-          <a:p>
-            <a:r>
-              <a:t>[FLAG]</a:t>
-            </a:r>
-          </a:p>
-        </p:txBody>
-      </p:sp>
       <p:pic>
         <p:nvPicPr>
-          <p:cNvPr id="6" name="Picture 5" descr="c16653f1-bbc9-466f-a6c5-c3ea24ea4478.jpg"/>
+          <p:cNvPr id="6" name="Picture 5" descr="6992d7cc-f125-4803-8e17-506341bf4acd.jpg"/>
           <p:cNvPicPr>
             <a:picLocks noChangeAspect="1"/>
           </p:cNvPicPr>
@@ -3287,24 +3305,117 @@
         </p:blipFill>
         <p:spPr>
           <a:xfrm>
-            <a:off x="190500" y="1143000"/>
-            <a:ext cx="10315575" cy="2857500"/>
+            <a:off x="83820" y="2237560"/>
+            <a:ext cx="9509760" cy="2256603"/>
           </a:xfrm>
           <a:prstGeom prst="rect">
             <a:avLst/>
           </a:prstGeom>
         </p:spPr>
       </p:pic>
-      <p:sp>
-        <p:nvSpPr>
-          <p:cNvPr id="7" name="TextBox 6"/>
+      <p:pic>
+        <p:nvPicPr>
+          <p:cNvPr id="7" name="Picture 6" descr="7395b04b-57a8-467b-ab93-f96243967a88.png"/>
+          <p:cNvPicPr>
+            <a:picLocks noChangeAspect="1"/>
+          </p:cNvPicPr>
+          <p:nvPr/>
+        </p:nvPicPr>
+        <p:blipFill>
+          <a:blip r:embed="rId4"/>
+          <a:stretch>
+            <a:fillRect/>
+          </a:stretch>
+        </p:blipFill>
+        <p:spPr>
+          <a:xfrm>
+            <a:off x="198120" y="380047"/>
+            <a:ext cx="762000" cy="428625"/>
+          </a:xfrm>
+          <a:prstGeom prst="rect">
+            <a:avLst/>
+          </a:prstGeom>
+        </p:spPr>
+      </p:pic>
+    </p:spTree>
+  </p:cSld>
+  <p:clrMapOvr>
+    <a:masterClrMapping/>
+  </p:clrMapOvr>
+</p:sld>
+</file>
+
+<file path=ppt/slides/slide3.xml><?xml version="1.0" encoding="utf-8"?>
+<p:sld xmlns:a="http://schemas.openxmlformats.org/drawingml/2006/main" xmlns:p="http://schemas.openxmlformats.org/presentationml/2006/main" xmlns:r="http://schemas.openxmlformats.org/officeDocument/2006/relationships">
+  <p:cSld>
+    <p:bg>
+      <p:bgPr>
+        <a:solidFill>
+          <a:srgbClr val="FFFFFF"/>
+        </a:solidFill>
+        <a:effectLst/>
+      </p:bgPr>
+    </p:bg>
+    <p:spTree>
+      <p:nvGrpSpPr>
+        <p:cNvPr id="1" name=""/>
+        <p:cNvGrpSpPr/>
+        <p:nvPr/>
+      </p:nvGrpSpPr>
+      <p:grpSpPr/>
+      <p:sp>
+        <p:nvSpPr>
+          <p:cNvPr id="2" name="Rectangle 1"/>
+          <p:cNvSpPr/>
+          <p:nvPr/>
+        </p:nvSpPr>
+        <p:spPr>
+          <a:xfrm>
+            <a:off x="0" y="0"/>
+            <a:ext cx="9753600" cy="5486400"/>
+          </a:xfrm>
+          <a:prstGeom prst="rect">
+            <a:avLst/>
+          </a:prstGeom>
+          <a:noFill/>
+          <a:ln w="50800">
+            <a:solidFill>
+              <a:srgbClr val="FF0000"/>
+            </a:solidFill>
+          </a:ln>
+        </p:spPr>
+        <p:style>
+          <a:lnRef idx="1">
+            <a:schemeClr val="accent1"/>
+          </a:lnRef>
+          <a:fillRef idx="3">
+            <a:schemeClr val="accent1"/>
+          </a:fillRef>
+          <a:effectRef idx="2">
+            <a:schemeClr val="accent1"/>
+          </a:effectRef>
+          <a:fontRef idx="minor">
+            <a:schemeClr val="lt1"/>
+          </a:fontRef>
+        </p:style>
+        <p:txBody>
+          <a:bodyPr rtlCol="0" anchor="ctr"/>
+          <a:lstStyle/>
+          <a:p>
+            <a:pPr algn="ctr"/>
+          </a:p>
+        </p:txBody>
+      </p:sp>
+      <p:sp>
+        <p:nvSpPr>
+          <p:cNvPr id="3" name="TextBox 2"/>
           <p:cNvSpPr txBox="1"/>
           <p:nvPr/>
         </p:nvSpPr>
         <p:spPr>
           <a:xfrm>
-            <a:off x="190500" y="4762500"/>
-            <a:ext cx="10315575" cy="1905000"/>
+            <a:off x="1143000" y="228600"/>
+            <a:ext cx="4023360" cy="289560"/>
           </a:xfrm>
           <a:prstGeom prst="rect">
             <a:avLst/>
@@ -3318,24 +3429,863 @@
           <a:lstStyle/>
           <a:p>
             <a:pPr>
-              <a:defRPr sz="1000"/>
+              <a:defRPr sz="2000" b="1"/>
             </a:pPr>
             <a:r>
-              <a:t>CARATTERISTICA | VALORE | CARATTERISTICA | VALORE</a:t>
-            </a:r>
-          </a:p>
-          <a:p>
-            <a:r>
-              <a:t>MOTORI | XXX | RADAR | XXX</a:t>
-            </a:r>
-          </a:p>
-          <a:p>
-            <a:r>
-              <a:t>ARMA | XXX | MITRAGLIERA | XXX</a:t>
-            </a:r>
-          </a:p>
-        </p:txBody>
-      </p:sp>
+              <a:t>DDG ANDREA DORIA</a:t>
+            </a:r>
+          </a:p>
+        </p:txBody>
+      </p:sp>
+      <p:sp>
+        <p:nvSpPr>
+          <p:cNvPr id="4" name="TextBox 3"/>
+          <p:cNvSpPr txBox="1"/>
+          <p:nvPr/>
+        </p:nvSpPr>
+        <p:spPr>
+          <a:xfrm>
+            <a:off x="1143000" y="609600"/>
+            <a:ext cx="4084320" cy="304800"/>
+          </a:xfrm>
+          <a:prstGeom prst="rect">
+            <a:avLst/>
+          </a:prstGeom>
+          <a:noFill/>
+        </p:spPr>
+        <p:txBody>
+          <a:bodyPr wrap="none">
+            <a:spAutoFit/>
+          </a:bodyPr>
+          <a:lstStyle/>
+          <a:p>
+            <a:pPr>
+              <a:defRPr sz="2000" b="1"/>
+            </a:pPr>
+            <a:r>
+              <a:t>CLASSE ORIZZONTE</a:t>
+            </a:r>
+          </a:p>
+        </p:txBody>
+      </p:sp>
+      <p:pic>
+        <p:nvPicPr>
+          <p:cNvPr id="5" name="Picture 4" descr="download_e9fcb18065e54612a9a7ae6345585518.png"/>
+          <p:cNvPicPr>
+            <a:picLocks noChangeAspect="1"/>
+          </p:cNvPicPr>
+          <p:nvPr/>
+        </p:nvPicPr>
+        <p:blipFill>
+          <a:blip r:embed="rId2"/>
+          <a:stretch>
+            <a:fillRect/>
+          </a:stretch>
+        </p:blipFill>
+        <p:spPr>
+          <a:xfrm>
+            <a:off x="8458200" y="217578"/>
+            <a:ext cx="1132114" cy="753563"/>
+          </a:xfrm>
+          <a:prstGeom prst="rect">
+            <a:avLst/>
+          </a:prstGeom>
+        </p:spPr>
+      </p:pic>
+      <p:pic>
+        <p:nvPicPr>
+          <p:cNvPr id="6" name="Picture 5" descr="6992d7cc-f125-4803-8e17-506341bf4acd.jpg"/>
+          <p:cNvPicPr>
+            <a:picLocks noChangeAspect="1"/>
+          </p:cNvPicPr>
+          <p:nvPr/>
+        </p:nvPicPr>
+        <p:blipFill>
+          <a:blip r:embed="rId3"/>
+          <a:stretch>
+            <a:fillRect/>
+          </a:stretch>
+        </p:blipFill>
+        <p:spPr>
+          <a:xfrm>
+            <a:off x="83820" y="2237560"/>
+            <a:ext cx="9509760" cy="2256603"/>
+          </a:xfrm>
+          <a:prstGeom prst="rect">
+            <a:avLst/>
+          </a:prstGeom>
+        </p:spPr>
+      </p:pic>
+      <p:pic>
+        <p:nvPicPr>
+          <p:cNvPr id="7" name="Picture 6" descr="7395b04b-57a8-467b-ab93-f96243967a88.png"/>
+          <p:cNvPicPr>
+            <a:picLocks noChangeAspect="1"/>
+          </p:cNvPicPr>
+          <p:nvPr/>
+        </p:nvPicPr>
+        <p:blipFill>
+          <a:blip r:embed="rId4"/>
+          <a:stretch>
+            <a:fillRect/>
+          </a:stretch>
+        </p:blipFill>
+        <p:spPr>
+          <a:xfrm>
+            <a:off x="198120" y="380047"/>
+            <a:ext cx="762000" cy="428625"/>
+          </a:xfrm>
+          <a:prstGeom prst="rect">
+            <a:avLst/>
+          </a:prstGeom>
+        </p:spPr>
+      </p:pic>
+    </p:spTree>
+  </p:cSld>
+  <p:clrMapOvr>
+    <a:masterClrMapping/>
+  </p:clrMapOvr>
+</p:sld>
+</file>
+
+<file path=ppt/slides/slide4.xml><?xml version="1.0" encoding="utf-8"?>
+<p:sld xmlns:a="http://schemas.openxmlformats.org/drawingml/2006/main" xmlns:p="http://schemas.openxmlformats.org/presentationml/2006/main" xmlns:r="http://schemas.openxmlformats.org/officeDocument/2006/relationships">
+  <p:cSld>
+    <p:bg>
+      <p:bgPr>
+        <a:solidFill>
+          <a:srgbClr val="FFFFFF"/>
+        </a:solidFill>
+        <a:effectLst/>
+      </p:bgPr>
+    </p:bg>
+    <p:spTree>
+      <p:nvGrpSpPr>
+        <p:cNvPr id="1" name=""/>
+        <p:cNvGrpSpPr/>
+        <p:nvPr/>
+      </p:nvGrpSpPr>
+      <p:grpSpPr/>
+      <p:sp>
+        <p:nvSpPr>
+          <p:cNvPr id="2" name="Rectangle 1"/>
+          <p:cNvSpPr/>
+          <p:nvPr/>
+        </p:nvSpPr>
+        <p:spPr>
+          <a:xfrm>
+            <a:off x="0" y="0"/>
+            <a:ext cx="9753600" cy="5486400"/>
+          </a:xfrm>
+          <a:prstGeom prst="rect">
+            <a:avLst/>
+          </a:prstGeom>
+          <a:noFill/>
+          <a:ln w="50800">
+            <a:solidFill>
+              <a:srgbClr val="000000"/>
+            </a:solidFill>
+          </a:ln>
+        </p:spPr>
+        <p:style>
+          <a:lnRef idx="1">
+            <a:schemeClr val="accent1"/>
+          </a:lnRef>
+          <a:fillRef idx="3">
+            <a:schemeClr val="accent1"/>
+          </a:fillRef>
+          <a:effectRef idx="2">
+            <a:schemeClr val="accent1"/>
+          </a:effectRef>
+          <a:fontRef idx="minor">
+            <a:schemeClr val="lt1"/>
+          </a:fontRef>
+        </p:style>
+        <p:txBody>
+          <a:bodyPr rtlCol="0" anchor="ctr"/>
+          <a:lstStyle/>
+          <a:p>
+            <a:pPr algn="ctr"/>
+          </a:p>
+        </p:txBody>
+      </p:sp>
+      <p:pic>
+        <p:nvPicPr>
+          <p:cNvPr id="3" name="Picture 2" descr="7e4bd9f4-d25d-4e6b-9413-253a0db1408f.png"/>
+          <p:cNvPicPr>
+            <a:picLocks noChangeAspect="1"/>
+          </p:cNvPicPr>
+          <p:nvPr/>
+        </p:nvPicPr>
+        <p:blipFill>
+          <a:blip r:embed="rId2"/>
+          <a:stretch>
+            <a:fillRect/>
+          </a:stretch>
+        </p:blipFill>
+        <p:spPr>
+          <a:xfrm>
+            <a:off x="381000" y="336327"/>
+            <a:ext cx="762000" cy="546544"/>
+          </a:xfrm>
+          <a:prstGeom prst="rect">
+            <a:avLst/>
+          </a:prstGeom>
+        </p:spPr>
+      </p:pic>
+      <p:pic>
+        <p:nvPicPr>
+          <p:cNvPr id="4" name="Picture 3" descr="download_6e8ec3dd15b24420a78481e6d438aaf0.png"/>
+          <p:cNvPicPr>
+            <a:picLocks noChangeAspect="1"/>
+          </p:cNvPicPr>
+          <p:nvPr/>
+        </p:nvPicPr>
+        <p:blipFill>
+          <a:blip r:embed="rId3"/>
+          <a:stretch>
+            <a:fillRect/>
+          </a:stretch>
+        </p:blipFill>
+        <p:spPr>
+          <a:xfrm>
+            <a:off x="8610600" y="230266"/>
+            <a:ext cx="762000" cy="507206"/>
+          </a:xfrm>
+          <a:prstGeom prst="rect">
+            <a:avLst/>
+          </a:prstGeom>
+        </p:spPr>
+      </p:pic>
+      <p:sp>
+        <p:nvSpPr>
+          <p:cNvPr id="5" name="TextBox 4"/>
+          <p:cNvSpPr txBox="1"/>
+          <p:nvPr/>
+        </p:nvSpPr>
+        <p:spPr>
+          <a:xfrm>
+            <a:off x="1295400" y="228600"/>
+            <a:ext cx="3810000" cy="304800"/>
+          </a:xfrm>
+          <a:prstGeom prst="rect">
+            <a:avLst/>
+          </a:prstGeom>
+          <a:noFill/>
+        </p:spPr>
+        <p:txBody>
+          <a:bodyPr wrap="none">
+            <a:spAutoFit/>
+          </a:bodyPr>
+          <a:lstStyle/>
+          <a:p>
+            <a:pPr>
+              <a:defRPr sz="2800" b="1">
+                <a:solidFill>
+                  <a:srgbClr val="1E40AF"/>
+                </a:solidFill>
+              </a:defRPr>
+            </a:pPr>
+            <a:r>
+              <a:t>asasa[NOME UNITÀ]</a:t>
+            </a:r>
+          </a:p>
+        </p:txBody>
+      </p:sp>
+      <p:sp>
+        <p:nvSpPr>
+          <p:cNvPr id="6" name="TextBox 5"/>
+          <p:cNvSpPr txBox="1"/>
+          <p:nvPr/>
+        </p:nvSpPr>
+        <p:spPr>
+          <a:xfrm>
+            <a:off x="1295400" y="609600"/>
+            <a:ext cx="3810000" cy="228600"/>
+          </a:xfrm>
+          <a:prstGeom prst="rect">
+            <a:avLst/>
+          </a:prstGeom>
+          <a:noFill/>
+        </p:spPr>
+        <p:txBody>
+          <a:bodyPr wrap="none">
+            <a:spAutoFit/>
+          </a:bodyPr>
+          <a:lstStyle/>
+          <a:p>
+            <a:pPr>
+              <a:defRPr sz="2000" b="0">
+                <a:solidFill>
+                  <a:srgbClr val="374151"/>
+                </a:solidFill>
+              </a:defRPr>
+            </a:pPr>
+            <a:r>
+              <a:t>sasasasa[CLASSE]</a:t>
+            </a:r>
+          </a:p>
+        </p:txBody>
+      </p:sp>
+      <p:pic>
+        <p:nvPicPr>
+          <p:cNvPr id="7" name="Picture 6" descr="4322125b-624e-4cf6-b1ce-7a4ecfa0e24b.png"/>
+          <p:cNvPicPr>
+            <a:picLocks noChangeAspect="1"/>
+          </p:cNvPicPr>
+          <p:nvPr/>
+        </p:nvPicPr>
+        <p:blipFill>
+          <a:blip r:embed="rId4"/>
+          <a:stretch>
+            <a:fillRect/>
+          </a:stretch>
+        </p:blipFill>
+        <p:spPr>
+          <a:xfrm>
+            <a:off x="2844800" y="1143000"/>
+            <a:ext cx="4064000" cy="2286000"/>
+          </a:xfrm>
+          <a:prstGeom prst="rect">
+            <a:avLst/>
+          </a:prstGeom>
+        </p:spPr>
+      </p:pic>
+      <p:graphicFrame>
+        <p:nvGraphicFramePr>
+          <p:cNvPr id="8" name="Table 7"/>
+          <p:cNvGraphicFramePr>
+            <a:graphicFrameLocks noGrp="1"/>
+          </p:cNvGraphicFramePr>
+          <p:nvPr/>
+        </p:nvGraphicFramePr>
+        <p:xfrm>
+          <a:off x="381000" y="3657600"/>
+          <a:ext cx="8991600" cy="1524000"/>
+        </p:xfrm>
+        <a:graphic>
+          <a:graphicData uri="http://schemas.openxmlformats.org/drawingml/2006/table">
+            <a:tbl>
+              <a:tblPr firstRow="1" bandRow="1">
+                <a:tableStyleId>{5C22544A-7EE6-4342-B048-85BDC9FD1C3A}</a:tableStyleId>
+              </a:tblPr>
+              <a:tblGrid>
+                <a:gridCol w="2247900"/>
+                <a:gridCol w="2247900"/>
+                <a:gridCol w="2247900"/>
+                <a:gridCol w="2247900"/>
+              </a:tblGrid>
+              <a:tr h="381000">
+                <a:tc>
+                  <a:txBody>
+                    <a:bodyPr/>
+                    <a:lstStyle/>
+                    <a:p>
+                      <a:pPr>
+                        <a:defRPr sz="900" b="1">
+                          <a:solidFill>
+                            <a:srgbClr val="FFFFFF"/>
+                          </a:solidFill>
+                        </a:defRPr>
+                      </a:pPr>
+                      <a:r>
+                        <a:t>CARATTERISTICA</a:t>
+                      </a:r>
+                    </a:p>
+                  </a:txBody>
+                  <a:tcPr>
+                    <a:solidFill>
+                      <a:srgbClr val="1F497D"/>
+                    </a:solidFill>
+                  </a:tcPr>
+                </a:tc>
+                <a:tc>
+                  <a:txBody>
+                    <a:bodyPr/>
+                    <a:lstStyle/>
+                    <a:p>
+                      <a:pPr>
+                        <a:defRPr sz="900" b="1">
+                          <a:solidFill>
+                            <a:srgbClr val="FFFFFF"/>
+                          </a:solidFill>
+                        </a:defRPr>
+                      </a:pPr>
+                      <a:r>
+                        <a:t>VALORE</a:t>
+                      </a:r>
+                    </a:p>
+                  </a:txBody>
+                  <a:tcPr>
+                    <a:solidFill>
+                      <a:srgbClr val="1F497D"/>
+                    </a:solidFill>
+                  </a:tcPr>
+                </a:tc>
+                <a:tc>
+                  <a:txBody>
+                    <a:bodyPr/>
+                    <a:lstStyle/>
+                    <a:p>
+                      <a:pPr>
+                        <a:defRPr sz="900" b="1">
+                          <a:solidFill>
+                            <a:srgbClr val="FFFFFF"/>
+                          </a:solidFill>
+                        </a:defRPr>
+                      </a:pPr>
+                      <a:r>
+                        <a:t>CARATTERISTICA</a:t>
+                      </a:r>
+                    </a:p>
+                  </a:txBody>
+                  <a:tcPr>
+                    <a:solidFill>
+                      <a:srgbClr val="1F497D"/>
+                    </a:solidFill>
+                  </a:tcPr>
+                </a:tc>
+                <a:tc>
+                  <a:txBody>
+                    <a:bodyPr/>
+                    <a:lstStyle/>
+                    <a:p>
+                      <a:pPr>
+                        <a:defRPr sz="900" b="1">
+                          <a:solidFill>
+                            <a:srgbClr val="FFFFFF"/>
+                          </a:solidFill>
+                        </a:defRPr>
+                      </a:pPr>
+                      <a:r>
+                        <a:t>VALORE</a:t>
+                      </a:r>
+                    </a:p>
+                  </a:txBody>
+                  <a:tcPr>
+                    <a:solidFill>
+                      <a:srgbClr val="1F497D"/>
+                    </a:solidFill>
+                  </a:tcPr>
+                </a:tc>
+              </a:tr>
+              <a:tr h="381000">
+                <a:tc>
+                  <a:txBody>
+                    <a:bodyPr/>
+                    <a:lstStyle/>
+                    <a:p>
+                      <a:pPr>
+                        <a:defRPr sz="900"/>
+                      </a:pPr>
+                      <a:r>
+                        <a:t>LUNGHEZZA</a:t>
+                      </a:r>
+                    </a:p>
+                  </a:txBody>
+                  <a:tcPr>
+                    <a:solidFill>
+                      <a:srgbClr val="FFFFFF"/>
+                    </a:solidFill>
+                  </a:tcPr>
+                </a:tc>
+                <a:tc>
+                  <a:txBody>
+                    <a:bodyPr/>
+                    <a:lstStyle/>
+                    <a:p>
+                      <a:pPr>
+                        <a:defRPr sz="900"/>
+                      </a:pPr>
+                      <a:r>
+                        <a:t>XXX m</a:t>
+                      </a:r>
+                    </a:p>
+                  </a:txBody>
+                  <a:tcPr>
+                    <a:solidFill>
+                      <a:srgbClr val="FFFFFF"/>
+                    </a:solidFill>
+                  </a:tcPr>
+                </a:tc>
+                <a:tc>
+                  <a:txBody>
+                    <a:bodyPr/>
+                    <a:lstStyle/>
+                    <a:p>
+                      <a:pPr>
+                        <a:defRPr sz="900"/>
+                      </a:pPr>
+                      <a:r>
+                        <a:t>LARGHEZZA</a:t>
+                      </a:r>
+                    </a:p>
+                  </a:txBody>
+                  <a:tcPr>
+                    <a:solidFill>
+                      <a:srgbClr val="FFFFFF"/>
+                    </a:solidFill>
+                  </a:tcPr>
+                </a:tc>
+                <a:tc>
+                  <a:txBody>
+                    <a:bodyPr/>
+                    <a:lstStyle/>
+                    <a:p>
+                      <a:pPr>
+                        <a:defRPr sz="900"/>
+                      </a:pPr>
+                      <a:r>
+                        <a:t>XXX m</a:t>
+                      </a:r>
+                    </a:p>
+                  </a:txBody>
+                  <a:tcPr>
+                    <a:solidFill>
+                      <a:srgbClr val="FFFFFF"/>
+                    </a:solidFill>
+                  </a:tcPr>
+                </a:tc>
+              </a:tr>
+              <a:tr h="381000">
+                <a:tc>
+                  <a:txBody>
+                    <a:bodyPr/>
+                    <a:lstStyle/>
+                    <a:p>
+                      <a:pPr>
+                        <a:defRPr sz="900"/>
+                      </a:pPr>
+                      <a:r>
+                        <a:t>DISLOCAMENTO</a:t>
+                      </a:r>
+                    </a:p>
+                  </a:txBody>
+                  <a:tcPr>
+                    <a:solidFill>
+                      <a:srgbClr val="F2F2F2"/>
+                    </a:solidFill>
+                  </a:tcPr>
+                </a:tc>
+                <a:tc>
+                  <a:txBody>
+                    <a:bodyPr/>
+                    <a:lstStyle/>
+                    <a:p>
+                      <a:pPr>
+                        <a:defRPr sz="900"/>
+                      </a:pPr>
+                      <a:r>
+                        <a:t>XXX t</a:t>
+                      </a:r>
+                    </a:p>
+                  </a:txBody>
+                  <a:tcPr>
+                    <a:solidFill>
+                      <a:srgbClr val="F2F2F2"/>
+                    </a:solidFill>
+                  </a:tcPr>
+                </a:tc>
+                <a:tc>
+                  <a:txBody>
+                    <a:bodyPr/>
+                    <a:lstStyle/>
+                    <a:p>
+                      <a:pPr>
+                        <a:defRPr sz="900"/>
+                      </a:pPr>
+                      <a:r>
+                        <a:t>VELOCITÀ</a:t>
+                      </a:r>
+                    </a:p>
+                  </a:txBody>
+                  <a:tcPr>
+                    <a:solidFill>
+                      <a:srgbClr val="F2F2F2"/>
+                    </a:solidFill>
+                  </a:tcPr>
+                </a:tc>
+                <a:tc>
+                  <a:txBody>
+                    <a:bodyPr/>
+                    <a:lstStyle/>
+                    <a:p>
+                      <a:pPr>
+                        <a:defRPr sz="900"/>
+                      </a:pPr>
+                      <a:r>
+                        <a:t>XXX kn</a:t>
+                      </a:r>
+                    </a:p>
+                  </a:txBody>
+                  <a:tcPr>
+                    <a:solidFill>
+                      <a:srgbClr val="F2F2F2"/>
+                    </a:solidFill>
+                  </a:tcPr>
+                </a:tc>
+              </a:tr>
+              <a:tr h="381000">
+                <a:tc>
+                  <a:txBody>
+                    <a:bodyPr/>
+                    <a:lstStyle/>
+                    <a:p>
+                      <a:pPr>
+                        <a:defRPr sz="900"/>
+                      </a:pPr>
+                      <a:r>
+                        <a:t>EQUIPAGGIO</a:t>
+                      </a:r>
+                    </a:p>
+                  </a:txBody>
+                  <a:tcPr>
+                    <a:solidFill>
+                      <a:srgbClr val="FFFFFF"/>
+                    </a:solidFill>
+                  </a:tcPr>
+                </a:tc>
+                <a:tc>
+                  <a:txBody>
+                    <a:bodyPr/>
+                    <a:lstStyle/>
+                    <a:p>
+                      <a:pPr>
+                        <a:defRPr sz="900"/>
+                      </a:pPr>
+                      <a:r>
+                        <a:t>XXX</a:t>
+                      </a:r>
+                    </a:p>
+                  </a:txBody>
+                  <a:tcPr>
+                    <a:solidFill>
+                      <a:srgbClr val="FFFFFF"/>
+                    </a:solidFill>
+                  </a:tcPr>
+                </a:tc>
+                <a:tc>
+                  <a:txBody>
+                    <a:bodyPr/>
+                    <a:lstStyle/>
+                    <a:p>
+                      <a:pPr>
+                        <a:defRPr sz="900"/>
+                      </a:pPr>
+                      <a:r>
+                        <a:t>ARMA</a:t>
+                      </a:r>
+                    </a:p>
+                  </a:txBody>
+                  <a:tcPr>
+                    <a:solidFill>
+                      <a:srgbClr val="FFFFFF"/>
+                    </a:solidFill>
+                  </a:tcPr>
+                </a:tc>
+                <a:tc>
+                  <a:txBody>
+                    <a:bodyPr/>
+                    <a:lstStyle/>
+                    <a:p>
+                      <a:pPr>
+                        <a:defRPr sz="900"/>
+                      </a:pPr>
+                      <a:r>
+                        <a:t>XXX</a:t>
+                      </a:r>
+                    </a:p>
+                  </a:txBody>
+                  <a:tcPr>
+                    <a:solidFill>
+                      <a:srgbClr val="FFFFFF"/>
+                    </a:solidFill>
+                  </a:tcPr>
+                </a:tc>
+              </a:tr>
+            </a:tbl>
+          </a:graphicData>
+        </a:graphic>
+      </p:graphicFrame>
+    </p:spTree>
+  </p:cSld>
+  <p:clrMapOvr>
+    <a:masterClrMapping/>
+  </p:clrMapOvr>
+</p:sld>
+</file>
+
+<file path=ppt/slides/slide5.xml><?xml version="1.0" encoding="utf-8"?>
+<p:sld xmlns:a="http://schemas.openxmlformats.org/drawingml/2006/main" xmlns:p="http://schemas.openxmlformats.org/presentationml/2006/main" xmlns:r="http://schemas.openxmlformats.org/officeDocument/2006/relationships">
+  <p:cSld>
+    <p:bg>
+      <p:bgPr>
+        <a:solidFill>
+          <a:srgbClr val="FFFFFF"/>
+        </a:solidFill>
+        <a:effectLst/>
+      </p:bgPr>
+    </p:bg>
+    <p:spTree>
+      <p:nvGrpSpPr>
+        <p:cNvPr id="1" name=""/>
+        <p:cNvGrpSpPr/>
+        <p:nvPr/>
+      </p:nvGrpSpPr>
+      <p:grpSpPr/>
+      <p:sp>
+        <p:nvSpPr>
+          <p:cNvPr id="2" name="Rectangle 1"/>
+          <p:cNvSpPr/>
+          <p:nvPr/>
+        </p:nvSpPr>
+        <p:spPr>
+          <a:xfrm>
+            <a:off x="0" y="0"/>
+            <a:ext cx="9753600" cy="5486400"/>
+          </a:xfrm>
+          <a:prstGeom prst="rect">
+            <a:avLst/>
+          </a:prstGeom>
+          <a:noFill/>
+          <a:ln w="50800">
+            <a:solidFill>
+              <a:srgbClr val="FF0000"/>
+            </a:solidFill>
+          </a:ln>
+        </p:spPr>
+        <p:style>
+          <a:lnRef idx="1">
+            <a:schemeClr val="accent1"/>
+          </a:lnRef>
+          <a:fillRef idx="3">
+            <a:schemeClr val="accent1"/>
+          </a:fillRef>
+          <a:effectRef idx="2">
+            <a:schemeClr val="accent1"/>
+          </a:effectRef>
+          <a:fontRef idx="minor">
+            <a:schemeClr val="lt1"/>
+          </a:fontRef>
+        </p:style>
+        <p:txBody>
+          <a:bodyPr rtlCol="0" anchor="ctr"/>
+          <a:lstStyle/>
+          <a:p>
+            <a:pPr algn="ctr"/>
+          </a:p>
+        </p:txBody>
+      </p:sp>
+      <p:sp>
+        <p:nvSpPr>
+          <p:cNvPr id="3" name="TextBox 2"/>
+          <p:cNvSpPr txBox="1"/>
+          <p:nvPr/>
+        </p:nvSpPr>
+        <p:spPr>
+          <a:xfrm>
+            <a:off x="76200" y="228600"/>
+            <a:ext cx="4023360" cy="289560"/>
+          </a:xfrm>
+          <a:prstGeom prst="rect">
+            <a:avLst/>
+          </a:prstGeom>
+          <a:noFill/>
+        </p:spPr>
+        <p:txBody>
+          <a:bodyPr wrap="none">
+            <a:spAutoFit/>
+          </a:bodyPr>
+          <a:lstStyle/>
+          <a:p>
+            <a:pPr>
+              <a:defRPr sz="2000" b="1"/>
+            </a:pPr>
+            <a:r>
+              <a:t>sassa</a:t>
+            </a:r>
+          </a:p>
+        </p:txBody>
+      </p:sp>
+      <p:sp>
+        <p:nvSpPr>
+          <p:cNvPr id="4" name="TextBox 3"/>
+          <p:cNvSpPr txBox="1"/>
+          <p:nvPr/>
+        </p:nvSpPr>
+        <p:spPr>
+          <a:xfrm>
+            <a:off x="45720" y="609600"/>
+            <a:ext cx="4084320" cy="304800"/>
+          </a:xfrm>
+          <a:prstGeom prst="rect">
+            <a:avLst/>
+          </a:prstGeom>
+          <a:noFill/>
+        </p:spPr>
+        <p:txBody>
+          <a:bodyPr wrap="none">
+            <a:spAutoFit/>
+          </a:bodyPr>
+          <a:lstStyle/>
+          <a:p>
+            <a:pPr>
+              <a:defRPr sz="2000" b="1"/>
+            </a:pPr>
+            <a:r>
+              <a:t>sassasa</a:t>
+            </a:r>
+          </a:p>
+        </p:txBody>
+      </p:sp>
+      <p:pic>
+        <p:nvPicPr>
+          <p:cNvPr id="5" name="Picture 4" descr="download_4620add10319446c9c60ff76ada50fad.png"/>
+          <p:cNvPicPr>
+            <a:picLocks noChangeAspect="1"/>
+          </p:cNvPicPr>
+          <p:nvPr/>
+        </p:nvPicPr>
+        <p:blipFill>
+          <a:blip r:embed="rId2"/>
+          <a:stretch>
+            <a:fillRect/>
+          </a:stretch>
+        </p:blipFill>
+        <p:spPr>
+          <a:xfrm>
+            <a:off x="8458200" y="217578"/>
+            <a:ext cx="1132114" cy="753563"/>
+          </a:xfrm>
+          <a:prstGeom prst="rect">
+            <a:avLst/>
+          </a:prstGeom>
+        </p:spPr>
+      </p:pic>
+      <p:pic>
+        <p:nvPicPr>
+          <p:cNvPr id="6" name="Picture 5" descr="a1eefaaa-582d-4abc-8582-87d985c5e7ef.png"/>
+          <p:cNvPicPr>
+            <a:picLocks noChangeAspect="1"/>
+          </p:cNvPicPr>
+          <p:nvPr/>
+        </p:nvPicPr>
+        <p:blipFill>
+          <a:blip r:embed="rId3"/>
+          <a:stretch>
+            <a:fillRect/>
+          </a:stretch>
+        </p:blipFill>
+        <p:spPr>
+          <a:xfrm>
+            <a:off x="1858736" y="1379220"/>
+            <a:ext cx="5959927" cy="3973285"/>
+          </a:xfrm>
+          <a:prstGeom prst="rect">
+            <a:avLst/>
+          </a:prstGeom>
+        </p:spPr>
+      </p:pic>
     </p:spTree>
   </p:cSld>
   <p:clrMapOvr>

</xml_diff>